<commit_message>
#862 Class Design.pptx final push
</commit_message>
<xml_diff>
--- a/doc/3_ 설계서/Class Design.pptx
+++ b/doc/3_ 설계서/Class Design.pptx
@@ -6962,7 +6962,13 @@
           <p:cNvGraphicFramePr>
             <a:graphicFrameLocks noGrp="1"/>
           </p:cNvGraphicFramePr>
-          <p:nvPr/>
+          <p:nvPr>
+            <p:extLst>
+              <p:ext uri="{D42A27DB-BD31-4B8C-83A1-F6EECF244321}">
+                <p14:modId xmlns:p14="http://schemas.microsoft.com/office/powerpoint/2010/main" val="2216358545"/>
+              </p:ext>
+            </p:extLst>
+          </p:nvPr>
         </p:nvGraphicFramePr>
         <p:xfrm>
           <a:off x="5745891" y="1028006"/>
@@ -7477,20 +7483,14 @@
                         </a:spcAft>
                       </a:pPr>
                       <a:r>
-                        <a:rPr lang="ko-KR" altLang="en-US" sz="1100" dirty="0" err="1">
+                        <a:rPr lang="ko-KR" altLang="en-US" sz="1100" dirty="0">
                           <a:solidFill>
                             <a:schemeClr val="tx1"/>
                           </a:solidFill>
                           <a:latin typeface="+mn-lt"/>
                         </a:rPr>
-                        <a:t>버튼명</a:t>
-                      </a:r>
-                      <a:endParaRPr lang="ko-KR" altLang="en-US" sz="1100" dirty="0">
-                        <a:solidFill>
-                          <a:schemeClr val="tx1"/>
-                        </a:solidFill>
-                        <a:latin typeface="+mn-lt"/>
-                      </a:endParaRPr>
+                        <a:t>버튼 명</a:t>
+                      </a:r>
                     </a:p>
                   </a:txBody>
                   <a:tcPr marL="64770" marR="64770" marT="17907" marB="17907" anchor="ctr">
@@ -8630,7 +8630,13 @@
           <p:cNvGraphicFramePr>
             <a:graphicFrameLocks noGrp="1"/>
           </p:cNvGraphicFramePr>
-          <p:nvPr/>
+          <p:nvPr>
+            <p:extLst>
+              <p:ext uri="{D42A27DB-BD31-4B8C-83A1-F6EECF244321}">
+                <p14:modId xmlns:p14="http://schemas.microsoft.com/office/powerpoint/2010/main" val="2341293638"/>
+              </p:ext>
+            </p:extLst>
+          </p:nvPr>
         </p:nvGraphicFramePr>
         <p:xfrm>
           <a:off x="6061745" y="1236518"/>
@@ -8824,20 +8830,14 @@
                         </a:spcAft>
                       </a:pPr>
                       <a:r>
-                        <a:rPr lang="ko-KR" altLang="en-US" sz="1100" b="0" dirty="0" err="1">
+                        <a:rPr lang="ko-KR" altLang="en-US" sz="1100" b="0" dirty="0">
                           <a:solidFill>
                             <a:schemeClr val="tx1"/>
                           </a:solidFill>
                           <a:latin typeface="+mn-lt"/>
                         </a:rPr>
-                        <a:t>버튼명</a:t>
-                      </a:r>
-                      <a:endParaRPr lang="ko-KR" altLang="en-US" sz="1100" b="0" dirty="0">
-                        <a:solidFill>
-                          <a:schemeClr val="tx1"/>
-                        </a:solidFill>
-                        <a:latin typeface="+mn-lt"/>
-                      </a:endParaRPr>
+                        <a:t>버튼 명</a:t>
+                      </a:r>
                     </a:p>
                   </a:txBody>
                   <a:tcPr marL="64770" marR="64770" marT="17907" marB="17907" anchor="ctr">
@@ -11568,7 +11568,11 @@
             <a:graphicFrameLocks noGrp="1"/>
           </p:cNvGraphicFramePr>
           <p:nvPr>
-            <p:extLst/>
+            <p:extLst>
+              <p:ext uri="{D42A27DB-BD31-4B8C-83A1-F6EECF244321}">
+                <p14:modId xmlns:p14="http://schemas.microsoft.com/office/powerpoint/2010/main" val="1448986498"/>
+              </p:ext>
+            </p:extLst>
           </p:nvPr>
         </p:nvGraphicFramePr>
         <p:xfrm>
@@ -11973,20 +11977,14 @@
                         </a:spcAft>
                       </a:pPr>
                       <a:r>
-                        <a:rPr lang="ko-KR" altLang="en-US" sz="1100" b="0" dirty="0" err="1">
+                        <a:rPr lang="ko-KR" altLang="en-US" sz="1100" b="0" dirty="0">
                           <a:solidFill>
                             <a:schemeClr val="tx1"/>
                           </a:solidFill>
                           <a:latin typeface="+mn-lt"/>
                         </a:rPr>
-                        <a:t>버튼명</a:t>
-                      </a:r>
-                      <a:endParaRPr lang="ko-KR" altLang="en-US" sz="1100" b="0" dirty="0">
-                        <a:solidFill>
-                          <a:schemeClr val="tx1"/>
-                        </a:solidFill>
-                        <a:latin typeface="+mn-lt"/>
-                      </a:endParaRPr>
+                        <a:t>버튼 명</a:t>
+                      </a:r>
                     </a:p>
                   </a:txBody>
                   <a:tcPr marL="64770" marR="64770" marT="17907" marB="17907" anchor="ctr">
@@ -13120,7 +13118,13 @@
           <p:cNvGraphicFramePr>
             <a:graphicFrameLocks noGrp="1"/>
           </p:cNvGraphicFramePr>
-          <p:nvPr/>
+          <p:nvPr>
+            <p:extLst>
+              <p:ext uri="{D42A27DB-BD31-4B8C-83A1-F6EECF244321}">
+                <p14:modId xmlns:p14="http://schemas.microsoft.com/office/powerpoint/2010/main" val="3379625358"/>
+              </p:ext>
+            </p:extLst>
+          </p:nvPr>
         </p:nvGraphicFramePr>
         <p:xfrm>
           <a:off x="5133004" y="1355075"/>
@@ -13376,22 +13380,13 @@
                         </a:spcAft>
                       </a:pPr>
                       <a:r>
-                        <a:rPr lang="ko-KR" altLang="en-US" sz="1100" b="0" dirty="0" err="1">
+                        <a:rPr lang="ko-KR" altLang="en-US" sz="1100" b="0" dirty="0">
                           <a:solidFill>
                             <a:schemeClr val="tx1"/>
                           </a:solidFill>
                           <a:latin typeface="+mn-lt"/>
                         </a:rPr>
-                        <a:t>콤보</a:t>
-                      </a:r>
-                      <a:r>
-                        <a:rPr lang="ko-KR" altLang="en-US" sz="1100" b="0" dirty="0">
-                          <a:solidFill>
-                            <a:schemeClr val="tx1"/>
-                          </a:solidFill>
-                          <a:latin typeface="+mn-lt"/>
-                        </a:rPr>
-                        <a:t> 박스</a:t>
+                        <a:t>콤보 박스</a:t>
                       </a:r>
                       <a:endParaRPr lang="en-US" altLang="ko-KR" sz="1100" b="0" dirty="0">
                         <a:solidFill>
@@ -13615,20 +13610,14 @@
                         </a:spcAft>
                       </a:pPr>
                       <a:r>
-                        <a:rPr lang="ko-KR" altLang="en-US" sz="1100" b="0" dirty="0" err="1">
+                        <a:rPr lang="ko-KR" altLang="en-US" sz="1100" b="0" dirty="0">
                           <a:solidFill>
                             <a:schemeClr val="tx1"/>
                           </a:solidFill>
                           <a:latin typeface="+mn-lt"/>
                         </a:rPr>
-                        <a:t>버튼명</a:t>
-                      </a:r>
-                      <a:endParaRPr lang="ko-KR" altLang="en-US" sz="1100" b="0" dirty="0">
-                        <a:solidFill>
-                          <a:schemeClr val="tx1"/>
-                        </a:solidFill>
-                        <a:latin typeface="+mn-lt"/>
-                      </a:endParaRPr>
+                        <a:t>버튼 명</a:t>
+                      </a:r>
                     </a:p>
                   </a:txBody>
                   <a:tcPr marL="64770" marR="64770" marT="17907" marB="17907" anchor="ctr">
@@ -17156,7 +17145,13 @@
           <p:cNvGraphicFramePr>
             <a:graphicFrameLocks noGrp="1"/>
           </p:cNvGraphicFramePr>
-          <p:nvPr/>
+          <p:nvPr>
+            <p:extLst>
+              <p:ext uri="{D42A27DB-BD31-4B8C-83A1-F6EECF244321}">
+                <p14:modId xmlns:p14="http://schemas.microsoft.com/office/powerpoint/2010/main" val="56007463"/>
+              </p:ext>
+            </p:extLst>
+          </p:nvPr>
         </p:nvGraphicFramePr>
         <p:xfrm>
           <a:off x="6061745" y="1608468"/>
@@ -17495,20 +17490,14 @@
                         </a:spcAft>
                       </a:pPr>
                       <a:r>
-                        <a:rPr lang="ko-KR" altLang="en-US" sz="1100" b="0" dirty="0" err="1">
+                        <a:rPr lang="ko-KR" altLang="en-US" sz="1100" b="0" dirty="0">
                           <a:solidFill>
                             <a:schemeClr val="tx1"/>
                           </a:solidFill>
                           <a:latin typeface="+mn-lt"/>
                         </a:rPr>
-                        <a:t>버튼명</a:t>
-                      </a:r>
-                      <a:endParaRPr lang="ko-KR" altLang="en-US" sz="1100" b="0" dirty="0">
-                        <a:solidFill>
-                          <a:schemeClr val="tx1"/>
-                        </a:solidFill>
-                        <a:latin typeface="+mn-lt"/>
-                      </a:endParaRPr>
+                        <a:t>버튼 명</a:t>
+                      </a:r>
                     </a:p>
                   </a:txBody>
                   <a:tcPr marL="64770" marR="64770" marT="17907" marB="17907" anchor="ctr">
@@ -18061,7 +18050,13 @@
           <p:cNvGraphicFramePr>
             <a:graphicFrameLocks noGrp="1"/>
           </p:cNvGraphicFramePr>
-          <p:nvPr/>
+          <p:nvPr>
+            <p:extLst>
+              <p:ext uri="{D42A27DB-BD31-4B8C-83A1-F6EECF244321}">
+                <p14:modId xmlns:p14="http://schemas.microsoft.com/office/powerpoint/2010/main" val="979713201"/>
+              </p:ext>
+            </p:extLst>
+          </p:nvPr>
         </p:nvGraphicFramePr>
         <p:xfrm>
           <a:off x="6123530" y="1608468"/>
@@ -18400,20 +18395,14 @@
                         </a:spcAft>
                       </a:pPr>
                       <a:r>
-                        <a:rPr lang="ko-KR" altLang="en-US" sz="1100" b="0" dirty="0" err="1">
+                        <a:rPr lang="ko-KR" altLang="en-US" sz="1100" b="0" dirty="0">
                           <a:solidFill>
                             <a:schemeClr val="tx1"/>
                           </a:solidFill>
                           <a:latin typeface="+mn-lt"/>
                         </a:rPr>
-                        <a:t>버튼명</a:t>
-                      </a:r>
-                      <a:endParaRPr lang="ko-KR" altLang="en-US" sz="1100" b="0" dirty="0">
-                        <a:solidFill>
-                          <a:schemeClr val="tx1"/>
-                        </a:solidFill>
-                        <a:latin typeface="+mn-lt"/>
-                      </a:endParaRPr>
+                        <a:t>버튼 명</a:t>
+                      </a:r>
                     </a:p>
                   </a:txBody>
                   <a:tcPr marL="64770" marR="64770" marT="17907" marB="17907" anchor="ctr">
@@ -21620,7 +21609,13 @@
           <p:cNvGraphicFramePr>
             <a:graphicFrameLocks noGrp="1"/>
           </p:cNvGraphicFramePr>
-          <p:nvPr/>
+          <p:nvPr>
+            <p:extLst>
+              <p:ext uri="{D42A27DB-BD31-4B8C-83A1-F6EECF244321}">
+                <p14:modId xmlns:p14="http://schemas.microsoft.com/office/powerpoint/2010/main" val="1412853329"/>
+              </p:ext>
+            </p:extLst>
+          </p:nvPr>
         </p:nvGraphicFramePr>
         <p:xfrm>
           <a:off x="6061745" y="1478892"/>
@@ -21814,20 +21809,14 @@
                         </a:spcAft>
                       </a:pPr>
                       <a:r>
-                        <a:rPr lang="ko-KR" altLang="en-US" sz="1100" b="0" dirty="0" err="1">
+                        <a:rPr lang="ko-KR" altLang="en-US" sz="1100" b="0" dirty="0">
                           <a:solidFill>
                             <a:schemeClr val="tx1"/>
                           </a:solidFill>
                           <a:latin typeface="+mn-lt"/>
                         </a:rPr>
-                        <a:t>버튼명</a:t>
-                      </a:r>
-                      <a:endParaRPr lang="ko-KR" altLang="en-US" sz="1100" b="0" dirty="0">
-                        <a:solidFill>
-                          <a:schemeClr val="tx1"/>
-                        </a:solidFill>
-                        <a:latin typeface="+mn-lt"/>
-                      </a:endParaRPr>
+                        <a:t>버튼 명</a:t>
+                      </a:r>
                     </a:p>
                   </a:txBody>
                   <a:tcPr marL="64770" marR="64770" marT="17907" marB="17907" anchor="ctr">
@@ -26215,7 +26204,11 @@
             <a:graphicFrameLocks noGrp="1"/>
           </p:cNvGraphicFramePr>
           <p:nvPr>
-            <p:extLst/>
+            <p:extLst>
+              <p:ext uri="{D42A27DB-BD31-4B8C-83A1-F6EECF244321}">
+                <p14:modId xmlns:p14="http://schemas.microsoft.com/office/powerpoint/2010/main" val="3029220670"/>
+              </p:ext>
+            </p:extLst>
           </p:nvPr>
         </p:nvGraphicFramePr>
         <p:xfrm>
@@ -26511,22 +26504,13 @@
                         </a:spcAft>
                       </a:pPr>
                       <a:r>
-                        <a:rPr lang="en-US" altLang="ko-KR" sz="1100" b="0" baseline="0" dirty="0" err="1">
+                        <a:rPr lang="en-US" altLang="ko-KR" sz="1100" b="0" baseline="0" dirty="0">
                           <a:solidFill>
                             <a:schemeClr val="tx1"/>
                           </a:solidFill>
                           <a:latin typeface="+mn-lt"/>
                         </a:rPr>
-                        <a:t>Todo</a:t>
-                      </a:r>
-                      <a:r>
-                        <a:rPr lang="en-US" altLang="ko-KR" sz="1100" b="0" baseline="0" dirty="0">
-                          <a:solidFill>
-                            <a:schemeClr val="tx1"/>
-                          </a:solidFill>
-                          <a:latin typeface="+mn-lt"/>
-                        </a:rPr>
-                        <a:t> </a:t>
+                        <a:t>To do </a:t>
                       </a:r>
                       <a:r>
                         <a:rPr lang="ko-KR" altLang="en-US" sz="1100" b="0" baseline="0" dirty="0">
@@ -26629,20 +26613,14 @@
                         </a:spcAft>
                       </a:pPr>
                       <a:r>
-                        <a:rPr lang="ko-KR" altLang="en-US" sz="1100" b="0" dirty="0" err="1">
+                        <a:rPr lang="ko-KR" altLang="en-US" sz="1100" b="0" dirty="0">
                           <a:solidFill>
                             <a:schemeClr val="tx1"/>
                           </a:solidFill>
                           <a:latin typeface="+mn-lt"/>
                         </a:rPr>
-                        <a:t>버튼명</a:t>
-                      </a:r>
-                      <a:endParaRPr lang="ko-KR" altLang="en-US" sz="1100" b="0" dirty="0">
-                        <a:solidFill>
-                          <a:schemeClr val="tx1"/>
-                        </a:solidFill>
-                        <a:latin typeface="+mn-lt"/>
-                      </a:endParaRPr>
+                        <a:t>버튼 명</a:t>
+                      </a:r>
                     </a:p>
                   </a:txBody>
                   <a:tcPr marL="64770" marR="64770" marT="17907" marB="17907" anchor="ctr">
@@ -27999,13 +27977,13 @@
           <p:nvPr>
             <p:extLst>
               <p:ext uri="{D42A27DB-BD31-4B8C-83A1-F6EECF244321}">
-                <p14:modId xmlns:p14="http://schemas.microsoft.com/office/powerpoint/2010/main" val="4231166298"/>
+                <p14:modId xmlns:p14="http://schemas.microsoft.com/office/powerpoint/2010/main" val="612409964"/>
               </p:ext>
             </p:extLst>
           </p:nvPr>
         </p:nvGraphicFramePr>
         <p:xfrm>
-          <a:off x="5521569" y="1254369"/>
+          <a:off x="5521569" y="1066800"/>
           <a:ext cx="3338939" cy="4654062"/>
         </p:xfrm>
         <a:graphic>
@@ -28489,7 +28467,7 @@
                         </a:spcAft>
                       </a:pPr>
                       <a:r>
-                        <a:rPr lang="ko-KR" altLang="en-US" sz="1000" kern="0" spc="0" dirty="0" err="1">
+                        <a:rPr lang="ko-KR" altLang="en-US" sz="1000" kern="0" spc="0" dirty="0">
                           <a:solidFill>
                             <a:srgbClr val="000000"/>
                           </a:solidFill>
@@ -28497,7 +28475,7 @@
                           <a:latin typeface="+mn-ea"/>
                           <a:ea typeface="+mn-ea"/>
                         </a:rPr>
-                        <a:t>마감임박한</a:t>
+                        <a:t>마감 임박한</a:t>
                       </a:r>
                       <a:endParaRPr lang="en-US" altLang="ko-KR" sz="1000" kern="0" spc="0" dirty="0">
                         <a:solidFill>
@@ -29556,14 +29534,14 @@
           <p:nvPr>
             <p:extLst>
               <p:ext uri="{D42A27DB-BD31-4B8C-83A1-F6EECF244321}">
-                <p14:modId xmlns:p14="http://schemas.microsoft.com/office/powerpoint/2010/main" val="3273851432"/>
+                <p14:modId xmlns:p14="http://schemas.microsoft.com/office/powerpoint/2010/main" val="1598867931"/>
               </p:ext>
             </p:extLst>
           </p:nvPr>
         </p:nvGraphicFramePr>
         <p:xfrm>
           <a:off x="280988" y="1025525"/>
-          <a:ext cx="8582024" cy="3542368"/>
+          <a:ext cx="8582024" cy="4174146"/>
         </p:xfrm>
         <a:graphic>
           <a:graphicData uri="http://schemas.openxmlformats.org/drawingml/2006/table">
@@ -30481,6 +30459,130 @@
                 <a:extLst>
                   <a:ext uri="{0D108BD9-81ED-4DB2-BD59-A6C34878D82A}">
                     <a16:rowId xmlns:a16="http://schemas.microsoft.com/office/drawing/2014/main" val="446648392"/>
+                  </a:ext>
+                </a:extLst>
+              </a:tr>
+              <a:tr h="631778">
+                <a:tc>
+                  <a:txBody>
+                    <a:bodyPr/>
+                    <a:lstStyle/>
+                    <a:p>
+                      <a:pPr algn="ctr" latinLnBrk="1"/>
+                      <a:r>
+                        <a:rPr lang="en-US" altLang="ko-KR" sz="1200" b="0" dirty="0">
+                          <a:solidFill>
+                            <a:schemeClr val="tx1"/>
+                          </a:solidFill>
+                          <a:latin typeface="맑은 고딕" pitchFamily="50" charset="-127"/>
+                          <a:ea typeface="맑은 고딕" pitchFamily="50" charset="-127"/>
+                        </a:rPr>
+                        <a:t>2017.05.26</a:t>
+                      </a:r>
+                      <a:endParaRPr lang="ko-KR" altLang="en-US" sz="1200" b="0" dirty="0">
+                        <a:solidFill>
+                          <a:schemeClr val="tx1"/>
+                        </a:solidFill>
+                        <a:latin typeface="맑은 고딕" pitchFamily="50" charset="-127"/>
+                        <a:ea typeface="맑은 고딕" pitchFamily="50" charset="-127"/>
+                      </a:endParaRPr>
+                    </a:p>
+                  </a:txBody>
+                  <a:tcPr anchor="ctr">
+                    <a:solidFill>
+                      <a:schemeClr val="bg1"/>
+                    </a:solidFill>
+                  </a:tcPr>
+                </a:tc>
+                <a:tc>
+                  <a:txBody>
+                    <a:bodyPr/>
+                    <a:lstStyle/>
+                    <a:p>
+                      <a:pPr algn="ctr" latinLnBrk="1"/>
+                      <a:r>
+                        <a:rPr lang="en-US" altLang="ko-KR" sz="1200" b="0" dirty="0">
+                          <a:solidFill>
+                            <a:schemeClr val="tx1"/>
+                          </a:solidFill>
+                          <a:latin typeface="맑은 고딕" pitchFamily="50" charset="-127"/>
+                          <a:ea typeface="맑은 고딕" pitchFamily="50" charset="-127"/>
+                        </a:rPr>
+                        <a:t>1.4ver</a:t>
+                      </a:r>
+                      <a:endParaRPr lang="ko-KR" altLang="en-US" sz="1200" b="0" dirty="0">
+                        <a:solidFill>
+                          <a:schemeClr val="tx1"/>
+                        </a:solidFill>
+                        <a:latin typeface="맑은 고딕" pitchFamily="50" charset="-127"/>
+                        <a:ea typeface="맑은 고딕" pitchFamily="50" charset="-127"/>
+                      </a:endParaRPr>
+                    </a:p>
+                  </a:txBody>
+                  <a:tcPr anchor="ctr">
+                    <a:solidFill>
+                      <a:schemeClr val="bg1"/>
+                    </a:solidFill>
+                  </a:tcPr>
+                </a:tc>
+                <a:tc>
+                  <a:txBody>
+                    <a:bodyPr/>
+                    <a:lstStyle/>
+                    <a:p>
+                      <a:pPr algn="ctr" latinLnBrk="1"/>
+                      <a:r>
+                        <a:rPr lang="ko-KR" altLang="en-US" sz="1200" b="0" dirty="0">
+                          <a:solidFill>
+                            <a:schemeClr val="tx1"/>
+                          </a:solidFill>
+                          <a:latin typeface="맑은 고딕" pitchFamily="50" charset="-127"/>
+                          <a:ea typeface="맑은 고딕" pitchFamily="50" charset="-127"/>
+                        </a:rPr>
+                        <a:t>최종 수정</a:t>
+                      </a:r>
+                    </a:p>
+                  </a:txBody>
+                  <a:tcPr anchor="ctr">
+                    <a:solidFill>
+                      <a:schemeClr val="bg1"/>
+                    </a:solidFill>
+                  </a:tcPr>
+                </a:tc>
+                <a:tc>
+                  <a:txBody>
+                    <a:bodyPr/>
+                    <a:lstStyle/>
+                    <a:p>
+                      <a:pPr algn="ctr" latinLnBrk="1"/>
+                      <a:r>
+                        <a:rPr lang="ko-KR" altLang="en-US" sz="1200" b="0">
+                          <a:solidFill>
+                            <a:schemeClr val="tx1"/>
+                          </a:solidFill>
+                          <a:latin typeface="맑은 고딕" pitchFamily="50" charset="-127"/>
+                          <a:ea typeface="맑은 고딕" pitchFamily="50" charset="-127"/>
+                        </a:rPr>
+                        <a:t>오소정</a:t>
+                      </a:r>
+                      <a:endParaRPr lang="ko-KR" altLang="en-US" sz="1200" b="0" dirty="0">
+                        <a:solidFill>
+                          <a:schemeClr val="tx1"/>
+                        </a:solidFill>
+                        <a:latin typeface="맑은 고딕" pitchFamily="50" charset="-127"/>
+                        <a:ea typeface="맑은 고딕" pitchFamily="50" charset="-127"/>
+                      </a:endParaRPr>
+                    </a:p>
+                  </a:txBody>
+                  <a:tcPr anchor="ctr">
+                    <a:solidFill>
+                      <a:schemeClr val="bg1"/>
+                    </a:solidFill>
+                  </a:tcPr>
+                </a:tc>
+                <a:extLst>
+                  <a:ext uri="{0D108BD9-81ED-4DB2-BD59-A6C34878D82A}">
+                    <a16:rowId xmlns:a16="http://schemas.microsoft.com/office/drawing/2014/main" val="569420322"/>
                   </a:ext>
                 </a:extLst>
               </a:tr>
@@ -30733,29 +30835,7 @@
                           <a:ea typeface="+mn-ea"/>
                           <a:cs typeface="+mn-cs"/>
                         </a:rPr>
-                        <a:t>- public static void main(String[] </a:t>
-                      </a:r>
-                      <a:r>
-                        <a:rPr lang="en-US" altLang="ko-KR" sz="1200" b="0" kern="1200" dirty="0" err="1">
-                          <a:solidFill>
-                            <a:schemeClr val="dk1"/>
-                          </a:solidFill>
-                          <a:latin typeface="+mn-ea"/>
-                          <a:ea typeface="+mn-ea"/>
-                          <a:cs typeface="+mn-cs"/>
-                        </a:rPr>
-                        <a:t>args</a:t>
-                      </a:r>
-                      <a:r>
-                        <a:rPr lang="en-US" altLang="ko-KR" sz="1200" b="0" kern="1200" dirty="0">
-                          <a:solidFill>
-                            <a:schemeClr val="dk1"/>
-                          </a:solidFill>
-                          <a:latin typeface="+mn-ea"/>
-                          <a:ea typeface="+mn-ea"/>
-                          <a:cs typeface="+mn-cs"/>
-                        </a:rPr>
-                        <a:t>)</a:t>
+                        <a:t>- public static void main(String[] args)</a:t>
                       </a:r>
                       <a:endParaRPr lang="ko-KR" altLang="en-US" sz="1200" b="0" baseline="0" dirty="0">
                         <a:latin typeface="+mn-ea"/>
@@ -32596,7 +32676,7 @@
           <p:nvPr>
             <p:extLst>
               <p:ext uri="{D42A27DB-BD31-4B8C-83A1-F6EECF244321}">
-                <p14:modId xmlns:p14="http://schemas.microsoft.com/office/powerpoint/2010/main" val="772654412"/>
+                <p14:modId xmlns:p14="http://schemas.microsoft.com/office/powerpoint/2010/main" val="1737442452"/>
               </p:ext>
             </p:extLst>
           </p:nvPr>
@@ -32868,7 +32948,7 @@
                         </a:spcAft>
                       </a:pPr>
                       <a:r>
-                        <a:rPr lang="ko-KR" altLang="en-US" sz="1100" b="0" kern="0" spc="0" dirty="0" err="1">
+                        <a:rPr lang="ko-KR" altLang="en-US" sz="1100" b="0" kern="0" spc="0" dirty="0">
                           <a:solidFill>
                             <a:srgbClr val="000000"/>
                           </a:solidFill>
@@ -32876,16 +32956,8 @@
                           <a:latin typeface="+mn-ea"/>
                           <a:ea typeface="+mn-ea"/>
                         </a:rPr>
-                        <a:t>콤보박스영역</a:t>
-                      </a:r>
-                      <a:endParaRPr lang="ko-KR" altLang="en-US" sz="1100" b="0" kern="0" spc="0" dirty="0">
-                        <a:solidFill>
-                          <a:srgbClr val="000000"/>
-                        </a:solidFill>
-                        <a:effectLst/>
-                        <a:latin typeface="+mn-ea"/>
-                        <a:ea typeface="+mn-ea"/>
-                      </a:endParaRPr>
+                        <a:t>콤보 박스영역</a:t>
+                      </a:r>
                     </a:p>
                   </a:txBody>
                   <a:tcPr marL="64770" marR="64770" marT="17907" marB="17907" anchor="ctr">
@@ -34998,7 +35070,13 @@
           <p:cNvGraphicFramePr>
             <a:graphicFrameLocks noGrp="1"/>
           </p:cNvGraphicFramePr>
-          <p:nvPr/>
+          <p:nvPr>
+            <p:extLst>
+              <p:ext uri="{D42A27DB-BD31-4B8C-83A1-F6EECF244321}">
+                <p14:modId xmlns:p14="http://schemas.microsoft.com/office/powerpoint/2010/main" val="2820669041"/>
+              </p:ext>
+            </p:extLst>
+          </p:nvPr>
         </p:nvGraphicFramePr>
         <p:xfrm>
           <a:off x="5257799" y="1257300"/>
@@ -35359,20 +35437,14 @@
                         </a:spcAft>
                       </a:pPr>
                       <a:r>
-                        <a:rPr lang="ko-KR" altLang="en-US" sz="1100" b="0" dirty="0" err="1">
+                        <a:rPr lang="ko-KR" altLang="en-US" sz="1100" b="0" dirty="0">
                           <a:solidFill>
                             <a:schemeClr val="tx1"/>
                           </a:solidFill>
                           <a:latin typeface="+mn-lt"/>
                         </a:rPr>
-                        <a:t>버튼명</a:t>
-                      </a:r>
-                      <a:endParaRPr lang="ko-KR" altLang="en-US" sz="1100" b="0" dirty="0">
-                        <a:solidFill>
-                          <a:schemeClr val="tx1"/>
-                        </a:solidFill>
-                        <a:latin typeface="+mn-lt"/>
-                      </a:endParaRPr>
+                        <a:t>버튼 명</a:t>
+                      </a:r>
                     </a:p>
                   </a:txBody>
                   <a:tcPr marL="64770" marR="64770" marT="17907" marB="17907" anchor="ctr">
@@ -37480,7 +37552,13 @@
           <p:cNvGraphicFramePr>
             <a:graphicFrameLocks noGrp="1"/>
           </p:cNvGraphicFramePr>
-          <p:nvPr/>
+          <p:nvPr>
+            <p:extLst>
+              <p:ext uri="{D42A27DB-BD31-4B8C-83A1-F6EECF244321}">
+                <p14:modId xmlns:p14="http://schemas.microsoft.com/office/powerpoint/2010/main" val="3093265898"/>
+              </p:ext>
+            </p:extLst>
+          </p:nvPr>
         </p:nvGraphicFramePr>
         <p:xfrm>
           <a:off x="6061745" y="1019360"/>
@@ -37813,20 +37891,14 @@
                         </a:spcAft>
                       </a:pPr>
                       <a:r>
-                        <a:rPr lang="ko-KR" altLang="en-US" sz="1100" b="0" dirty="0" err="1">
+                        <a:rPr lang="ko-KR" altLang="en-US" sz="1100" b="0" dirty="0">
                           <a:solidFill>
                             <a:schemeClr val="tx1"/>
                           </a:solidFill>
                           <a:latin typeface="+mn-lt"/>
                         </a:rPr>
-                        <a:t>버튼명</a:t>
-                      </a:r>
-                      <a:endParaRPr lang="ko-KR" altLang="en-US" sz="1100" b="0" dirty="0">
-                        <a:solidFill>
-                          <a:schemeClr val="tx1"/>
-                        </a:solidFill>
-                        <a:latin typeface="+mn-lt"/>
-                      </a:endParaRPr>
+                        <a:t>버튼 명</a:t>
+                      </a:r>
                     </a:p>
                   </a:txBody>
                   <a:tcPr marL="64770" marR="64770" marT="17907" marB="17907" anchor="ctr">

</xml_diff>